<commit_message>
2nd analyse and diapo
</commit_message>
<xml_diff>
--- a/Stats.pptx
+++ b/Stats.pptx
@@ -5,10 +5,10 @@
     <p:sldMasterId id="2147483660" r:id="rId4"/>
   </p:sldMasterIdLst>
   <p:notesMasterIdLst>
-    <p:notesMasterId r:id="rId18"/>
+    <p:notesMasterId r:id="rId21"/>
   </p:notesMasterIdLst>
   <p:handoutMasterIdLst>
-    <p:handoutMasterId r:id="rId19"/>
+    <p:handoutMasterId r:id="rId22"/>
   </p:handoutMasterIdLst>
   <p:sldIdLst>
     <p:sldId id="298" r:id="rId5"/>
@@ -20,10 +20,13 @@
     <p:sldId id="308" r:id="rId11"/>
     <p:sldId id="307" r:id="rId12"/>
     <p:sldId id="309" r:id="rId13"/>
-    <p:sldId id="310" r:id="rId14"/>
-    <p:sldId id="306" r:id="rId15"/>
-    <p:sldId id="311" r:id="rId16"/>
-    <p:sldId id="312" r:id="rId17"/>
+    <p:sldId id="313" r:id="rId14"/>
+    <p:sldId id="310" r:id="rId15"/>
+    <p:sldId id="306" r:id="rId16"/>
+    <p:sldId id="314" r:id="rId17"/>
+    <p:sldId id="311" r:id="rId18"/>
+    <p:sldId id="312" r:id="rId19"/>
+    <p:sldId id="315" r:id="rId20"/>
   </p:sldIdLst>
   <p:sldSz cx="12192000" cy="6858000"/>
   <p:notesSz cx="6858000" cy="9144000"/>
@@ -805,7 +808,7 @@
     </p:spTree>
     <p:extLst>
       <p:ext uri="{BB962C8B-B14F-4D97-AF65-F5344CB8AC3E}">
-        <p14:creationId xmlns:p14="http://schemas.microsoft.com/office/powerpoint/2010/main" val="263710019"/>
+        <p14:creationId xmlns:p14="http://schemas.microsoft.com/office/powerpoint/2010/main" val="660550658"/>
       </p:ext>
     </p:extLst>
   </p:cSld>
@@ -889,7 +892,7 @@
     </p:spTree>
     <p:extLst>
       <p:ext uri="{BB962C8B-B14F-4D97-AF65-F5344CB8AC3E}">
-        <p14:creationId xmlns:p14="http://schemas.microsoft.com/office/powerpoint/2010/main" val="2732436969"/>
+        <p14:creationId xmlns:p14="http://schemas.microsoft.com/office/powerpoint/2010/main" val="263710019"/>
       </p:ext>
     </p:extLst>
   </p:cSld>
@@ -973,7 +976,259 @@
     </p:spTree>
     <p:extLst>
       <p:ext uri="{BB962C8B-B14F-4D97-AF65-F5344CB8AC3E}">
+        <p14:creationId xmlns:p14="http://schemas.microsoft.com/office/powerpoint/2010/main" val="2781311793"/>
+      </p:ext>
+    </p:extLst>
+  </p:cSld>
+  <p:clrMapOvr>
+    <a:masterClrMapping/>
+  </p:clrMapOvr>
+</p:notes>
+</file>
+
+<file path=ppt/notesSlides/notesSlide13.xml><?xml version="1.0" encoding="utf-8"?>
+<p:notes xmlns:a="http://schemas.openxmlformats.org/drawingml/2006/main" xmlns:r="http://schemas.openxmlformats.org/officeDocument/2006/relationships" xmlns:p="http://schemas.openxmlformats.org/presentationml/2006/main">
+  <p:cSld>
+    <p:spTree>
+      <p:nvGrpSpPr>
+        <p:cNvPr id="1" name=""/>
+        <p:cNvGrpSpPr/>
+        <p:nvPr/>
+      </p:nvGrpSpPr>
+      <p:grpSpPr>
+        <a:xfrm>
+          <a:off x="0" y="0"/>
+          <a:ext cx="0" cy="0"/>
+          <a:chOff x="0" y="0"/>
+          <a:chExt cx="0" cy="0"/>
+        </a:xfrm>
+      </p:grpSpPr>
+      <p:sp>
+        <p:nvSpPr>
+          <p:cNvPr id="2" name="Espace réservé de l'image des diapositives 1"/>
+          <p:cNvSpPr>
+            <a:spLocks noGrp="1" noRot="1" noChangeAspect="1"/>
+          </p:cNvSpPr>
+          <p:nvPr>
+            <p:ph type="sldImg"/>
+          </p:nvPr>
+        </p:nvSpPr>
+        <p:spPr/>
+      </p:sp>
+      <p:sp>
+        <p:nvSpPr>
+          <p:cNvPr id="3" name="Espace réservé des notes 2"/>
+          <p:cNvSpPr>
+            <a:spLocks noGrp="1"/>
+          </p:cNvSpPr>
+          <p:nvPr>
+            <p:ph type="body" idx="1"/>
+          </p:nvPr>
+        </p:nvSpPr>
+        <p:spPr/>
+        <p:txBody>
+          <a:bodyPr/>
+          <a:lstStyle/>
+          <a:p>
+            <a:endParaRPr lang="fr-FR" dirty="0"/>
+          </a:p>
+        </p:txBody>
+      </p:sp>
+      <p:sp>
+        <p:nvSpPr>
+          <p:cNvPr id="4" name="Espace réservé du numéro de diapositive 3"/>
+          <p:cNvSpPr>
+            <a:spLocks noGrp="1"/>
+          </p:cNvSpPr>
+          <p:nvPr>
+            <p:ph type="sldNum" sz="quarter" idx="10"/>
+          </p:nvPr>
+        </p:nvSpPr>
+        <p:spPr/>
+        <p:txBody>
+          <a:bodyPr/>
+          <a:lstStyle/>
+          <a:p>
+            <a:fld id="{1DB0C060-F7D4-4C65-826A-795CA5BE88E2}" type="slidenum">
+              <a:rPr lang="fr-FR" smtClean="0"/>
+              <a:t>14</a:t>
+            </a:fld>
+            <a:endParaRPr lang="fr-FR" dirty="0"/>
+          </a:p>
+        </p:txBody>
+      </p:sp>
+    </p:spTree>
+    <p:extLst>
+      <p:ext uri="{BB962C8B-B14F-4D97-AF65-F5344CB8AC3E}">
+        <p14:creationId xmlns:p14="http://schemas.microsoft.com/office/powerpoint/2010/main" val="2732436969"/>
+      </p:ext>
+    </p:extLst>
+  </p:cSld>
+  <p:clrMapOvr>
+    <a:masterClrMapping/>
+  </p:clrMapOvr>
+</p:notes>
+</file>
+
+<file path=ppt/notesSlides/notesSlide14.xml><?xml version="1.0" encoding="utf-8"?>
+<p:notes xmlns:a="http://schemas.openxmlformats.org/drawingml/2006/main" xmlns:r="http://schemas.openxmlformats.org/officeDocument/2006/relationships" xmlns:p="http://schemas.openxmlformats.org/presentationml/2006/main">
+  <p:cSld>
+    <p:spTree>
+      <p:nvGrpSpPr>
+        <p:cNvPr id="1" name=""/>
+        <p:cNvGrpSpPr/>
+        <p:nvPr/>
+      </p:nvGrpSpPr>
+      <p:grpSpPr>
+        <a:xfrm>
+          <a:off x="0" y="0"/>
+          <a:ext cx="0" cy="0"/>
+          <a:chOff x="0" y="0"/>
+          <a:chExt cx="0" cy="0"/>
+        </a:xfrm>
+      </p:grpSpPr>
+      <p:sp>
+        <p:nvSpPr>
+          <p:cNvPr id="2" name="Espace réservé de l'image des diapositives 1"/>
+          <p:cNvSpPr>
+            <a:spLocks noGrp="1" noRot="1" noChangeAspect="1"/>
+          </p:cNvSpPr>
+          <p:nvPr>
+            <p:ph type="sldImg"/>
+          </p:nvPr>
+        </p:nvSpPr>
+        <p:spPr/>
+      </p:sp>
+      <p:sp>
+        <p:nvSpPr>
+          <p:cNvPr id="3" name="Espace réservé des notes 2"/>
+          <p:cNvSpPr>
+            <a:spLocks noGrp="1"/>
+          </p:cNvSpPr>
+          <p:nvPr>
+            <p:ph type="body" idx="1"/>
+          </p:nvPr>
+        </p:nvSpPr>
+        <p:spPr/>
+        <p:txBody>
+          <a:bodyPr/>
+          <a:lstStyle/>
+          <a:p>
+            <a:endParaRPr lang="fr-FR" dirty="0"/>
+          </a:p>
+        </p:txBody>
+      </p:sp>
+      <p:sp>
+        <p:nvSpPr>
+          <p:cNvPr id="4" name="Espace réservé du numéro de diapositive 3"/>
+          <p:cNvSpPr>
+            <a:spLocks noGrp="1"/>
+          </p:cNvSpPr>
+          <p:nvPr>
+            <p:ph type="sldNum" sz="quarter" idx="10"/>
+          </p:nvPr>
+        </p:nvSpPr>
+        <p:spPr/>
+        <p:txBody>
+          <a:bodyPr/>
+          <a:lstStyle/>
+          <a:p>
+            <a:fld id="{1DB0C060-F7D4-4C65-826A-795CA5BE88E2}" type="slidenum">
+              <a:rPr lang="fr-FR" smtClean="0"/>
+              <a:t>15</a:t>
+            </a:fld>
+            <a:endParaRPr lang="fr-FR" dirty="0"/>
+          </a:p>
+        </p:txBody>
+      </p:sp>
+    </p:spTree>
+    <p:extLst>
+      <p:ext uri="{BB962C8B-B14F-4D97-AF65-F5344CB8AC3E}">
         <p14:creationId xmlns:p14="http://schemas.microsoft.com/office/powerpoint/2010/main" val="1903860498"/>
+      </p:ext>
+    </p:extLst>
+  </p:cSld>
+  <p:clrMapOvr>
+    <a:masterClrMapping/>
+  </p:clrMapOvr>
+</p:notes>
+</file>
+
+<file path=ppt/notesSlides/notesSlide15.xml><?xml version="1.0" encoding="utf-8"?>
+<p:notes xmlns:a="http://schemas.openxmlformats.org/drawingml/2006/main" xmlns:r="http://schemas.openxmlformats.org/officeDocument/2006/relationships" xmlns:p="http://schemas.openxmlformats.org/presentationml/2006/main">
+  <p:cSld>
+    <p:spTree>
+      <p:nvGrpSpPr>
+        <p:cNvPr id="1" name=""/>
+        <p:cNvGrpSpPr/>
+        <p:nvPr/>
+      </p:nvGrpSpPr>
+      <p:grpSpPr>
+        <a:xfrm>
+          <a:off x="0" y="0"/>
+          <a:ext cx="0" cy="0"/>
+          <a:chOff x="0" y="0"/>
+          <a:chExt cx="0" cy="0"/>
+        </a:xfrm>
+      </p:grpSpPr>
+      <p:sp>
+        <p:nvSpPr>
+          <p:cNvPr id="2" name="Espace réservé de l'image des diapositives 1"/>
+          <p:cNvSpPr>
+            <a:spLocks noGrp="1" noRot="1" noChangeAspect="1"/>
+          </p:cNvSpPr>
+          <p:nvPr>
+            <p:ph type="sldImg"/>
+          </p:nvPr>
+        </p:nvSpPr>
+        <p:spPr/>
+      </p:sp>
+      <p:sp>
+        <p:nvSpPr>
+          <p:cNvPr id="3" name="Espace réservé des notes 2"/>
+          <p:cNvSpPr>
+            <a:spLocks noGrp="1"/>
+          </p:cNvSpPr>
+          <p:nvPr>
+            <p:ph type="body" idx="1"/>
+          </p:nvPr>
+        </p:nvSpPr>
+        <p:spPr/>
+        <p:txBody>
+          <a:bodyPr/>
+          <a:lstStyle/>
+          <a:p>
+            <a:endParaRPr lang="fr-FR" dirty="0"/>
+          </a:p>
+        </p:txBody>
+      </p:sp>
+      <p:sp>
+        <p:nvSpPr>
+          <p:cNvPr id="4" name="Espace réservé du numéro de diapositive 3"/>
+          <p:cNvSpPr>
+            <a:spLocks noGrp="1"/>
+          </p:cNvSpPr>
+          <p:nvPr>
+            <p:ph type="sldNum" sz="quarter" idx="10"/>
+          </p:nvPr>
+        </p:nvSpPr>
+        <p:spPr/>
+        <p:txBody>
+          <a:bodyPr/>
+          <a:lstStyle/>
+          <a:p>
+            <a:fld id="{1DB0C060-F7D4-4C65-826A-795CA5BE88E2}" type="slidenum">
+              <a:rPr lang="fr-FR" smtClean="0"/>
+              <a:t>16</a:t>
+            </a:fld>
+            <a:endParaRPr lang="fr-FR" dirty="0"/>
+          </a:p>
+        </p:txBody>
+      </p:sp>
+    </p:spTree>
+    <p:extLst>
+      <p:ext uri="{BB962C8B-B14F-4D97-AF65-F5344CB8AC3E}">
+        <p14:creationId xmlns:p14="http://schemas.microsoft.com/office/powerpoint/2010/main" val="1752842186"/>
       </p:ext>
     </p:extLst>
   </p:cSld>
@@ -1645,7 +1900,7 @@
     </p:spTree>
     <p:extLst>
       <p:ext uri="{BB962C8B-B14F-4D97-AF65-F5344CB8AC3E}">
-        <p14:creationId xmlns:p14="http://schemas.microsoft.com/office/powerpoint/2010/main" val="660550658"/>
+        <p14:creationId xmlns:p14="http://schemas.microsoft.com/office/powerpoint/2010/main" val="923855900"/>
       </p:ext>
     </p:extLst>
   </p:cSld>
@@ -5394,11 +5649,196 @@
           <a:p>
             <a:r>
               <a:rPr lang="fr-FR" dirty="0"/>
-              <a:t>Analyse 4 : </a:t>
+              <a:t>Analyse 3 : Nbre vaccinés / Région </a:t>
             </a:r>
           </a:p>
         </p:txBody>
       </p:sp>
+      <p:pic>
+        <p:nvPicPr>
+          <p:cNvPr id="4" name="Image 3">
+            <a:extLst>
+              <a:ext uri="{FF2B5EF4-FFF2-40B4-BE49-F238E27FC236}">
+                <a16:creationId xmlns:a16="http://schemas.microsoft.com/office/drawing/2014/main" id="{A10075FA-C125-4CA0-6A2D-1ACE9ADEA76A}"/>
+              </a:ext>
+            </a:extLst>
+          </p:cNvPr>
+          <p:cNvPicPr>
+            <a:picLocks noChangeAspect="1"/>
+          </p:cNvPicPr>
+          <p:nvPr/>
+        </p:nvPicPr>
+        <p:blipFill>
+          <a:blip r:embed="rId3"/>
+          <a:stretch>
+            <a:fillRect/>
+          </a:stretch>
+        </p:blipFill>
+        <p:spPr>
+          <a:xfrm>
+            <a:off x="4725721" y="2209054"/>
+            <a:ext cx="6378493" cy="3010161"/>
+          </a:xfrm>
+          <a:prstGeom prst="rect">
+            <a:avLst/>
+          </a:prstGeom>
+        </p:spPr>
+      </p:pic>
+      <p:pic>
+        <p:nvPicPr>
+          <p:cNvPr id="8" name="Image 7">
+            <a:extLst>
+              <a:ext uri="{FF2B5EF4-FFF2-40B4-BE49-F238E27FC236}">
+                <a16:creationId xmlns:a16="http://schemas.microsoft.com/office/drawing/2014/main" id="{A2AD764B-F19B-B93E-FA17-8333922AF84E}"/>
+              </a:ext>
+            </a:extLst>
+          </p:cNvPr>
+          <p:cNvPicPr>
+            <a:picLocks noChangeAspect="1"/>
+          </p:cNvPicPr>
+          <p:nvPr/>
+        </p:nvPicPr>
+        <p:blipFill>
+          <a:blip r:embed="rId4"/>
+          <a:stretch>
+            <a:fillRect/>
+          </a:stretch>
+        </p:blipFill>
+        <p:spPr>
+          <a:xfrm>
+            <a:off x="1428661" y="3251619"/>
+            <a:ext cx="2809811" cy="986084"/>
+          </a:xfrm>
+          <a:prstGeom prst="rect">
+            <a:avLst/>
+          </a:prstGeom>
+        </p:spPr>
+      </p:pic>
+    </p:spTree>
+    <p:extLst>
+      <p:ext uri="{BB962C8B-B14F-4D97-AF65-F5344CB8AC3E}">
+        <p14:creationId xmlns:p14="http://schemas.microsoft.com/office/powerpoint/2010/main" val="4019912152"/>
+      </p:ext>
+    </p:extLst>
+  </p:cSld>
+  <p:clrMapOvr>
+    <a:masterClrMapping/>
+  </p:clrMapOvr>
+</p:sld>
+</file>
+
+<file path=ppt/slides/slide11.xml><?xml version="1.0" encoding="utf-8"?>
+<p:sld xmlns:a="http://schemas.openxmlformats.org/drawingml/2006/main" xmlns:r="http://schemas.openxmlformats.org/officeDocument/2006/relationships" xmlns:p="http://schemas.openxmlformats.org/presentationml/2006/main">
+  <p:cSld>
+    <p:spTree>
+      <p:nvGrpSpPr>
+        <p:cNvPr id="1" name=""/>
+        <p:cNvGrpSpPr/>
+        <p:nvPr/>
+      </p:nvGrpSpPr>
+      <p:grpSpPr>
+        <a:xfrm>
+          <a:off x="0" y="0"/>
+          <a:ext cx="0" cy="0"/>
+          <a:chOff x="0" y="0"/>
+          <a:chExt cx="0" cy="0"/>
+        </a:xfrm>
+      </p:grpSpPr>
+      <p:sp>
+        <p:nvSpPr>
+          <p:cNvPr id="2" name="Titre 1">
+            <a:extLst>
+              <a:ext uri="{FF2B5EF4-FFF2-40B4-BE49-F238E27FC236}">
+                <a16:creationId xmlns:a16="http://schemas.microsoft.com/office/drawing/2014/main" id="{75AC86D3-8FD1-4F47-A319-7D0542E48B2F}"/>
+              </a:ext>
+            </a:extLst>
+          </p:cNvPr>
+          <p:cNvSpPr>
+            <a:spLocks noGrp="1"/>
+          </p:cNvSpPr>
+          <p:nvPr>
+            <p:ph type="title"/>
+          </p:nvPr>
+        </p:nvSpPr>
+        <p:spPr>
+          <a:xfrm>
+            <a:off x="1097279" y="286603"/>
+            <a:ext cx="10679917" cy="1450757"/>
+          </a:xfrm>
+        </p:spPr>
+        <p:txBody>
+          <a:bodyPr vert="horz" lIns="91440" tIns="45720" rIns="91440" bIns="45720" rtlCol="0">
+            <a:normAutofit/>
+          </a:bodyPr>
+          <a:lstStyle/>
+          <a:p>
+            <a:r>
+              <a:rPr lang="fr-FR" dirty="0"/>
+              <a:t>Analyse 4 : Nbre vaccinés / Tranches d’âge </a:t>
+            </a:r>
+          </a:p>
+        </p:txBody>
+      </p:sp>
+      <p:pic>
+        <p:nvPicPr>
+          <p:cNvPr id="4" name="Image 3">
+            <a:extLst>
+              <a:ext uri="{FF2B5EF4-FFF2-40B4-BE49-F238E27FC236}">
+                <a16:creationId xmlns:a16="http://schemas.microsoft.com/office/drawing/2014/main" id="{741F6331-5BF3-C39E-AD65-CE6056D2C93E}"/>
+              </a:ext>
+            </a:extLst>
+          </p:cNvPr>
+          <p:cNvPicPr>
+            <a:picLocks noChangeAspect="1"/>
+          </p:cNvPicPr>
+          <p:nvPr/>
+        </p:nvPicPr>
+        <p:blipFill>
+          <a:blip r:embed="rId3"/>
+          <a:stretch>
+            <a:fillRect/>
+          </a:stretch>
+        </p:blipFill>
+        <p:spPr>
+          <a:xfrm>
+            <a:off x="718477" y="2322326"/>
+            <a:ext cx="5534840" cy="3724836"/>
+          </a:xfrm>
+          <a:prstGeom prst="rect">
+            <a:avLst/>
+          </a:prstGeom>
+        </p:spPr>
+      </p:pic>
+      <p:pic>
+        <p:nvPicPr>
+          <p:cNvPr id="6" name="Image 5">
+            <a:extLst>
+              <a:ext uri="{FF2B5EF4-FFF2-40B4-BE49-F238E27FC236}">
+                <a16:creationId xmlns:a16="http://schemas.microsoft.com/office/drawing/2014/main" id="{9CAC1915-6AF5-7AB2-BAAE-DA5688DC1C14}"/>
+              </a:ext>
+            </a:extLst>
+          </p:cNvPr>
+          <p:cNvPicPr>
+            <a:picLocks noChangeAspect="1"/>
+          </p:cNvPicPr>
+          <p:nvPr/>
+        </p:nvPicPr>
+        <p:blipFill>
+          <a:blip r:embed="rId4"/>
+          <a:stretch>
+            <a:fillRect/>
+          </a:stretch>
+        </p:blipFill>
+        <p:spPr>
+          <a:xfrm>
+            <a:off x="7752989" y="2183151"/>
+            <a:ext cx="2323764" cy="3864011"/>
+          </a:xfrm>
+          <a:prstGeom prst="rect">
+            <a:avLst/>
+          </a:prstGeom>
+        </p:spPr>
+      </p:pic>
     </p:spTree>
     <p:extLst>
       <p:ext uri="{BB962C8B-B14F-4D97-AF65-F5344CB8AC3E}">
@@ -5412,7 +5852,7 @@
 </p:sld>
 </file>
 
-<file path=ppt/slides/slide11.xml><?xml version="1.0" encoding="utf-8"?>
+<file path=ppt/slides/slide12.xml><?xml version="1.0" encoding="utf-8"?>
 <p:sld xmlns:a="http://schemas.openxmlformats.org/drawingml/2006/main" xmlns:r="http://schemas.openxmlformats.org/officeDocument/2006/relationships" xmlns:p="http://schemas.openxmlformats.org/presentationml/2006/main">
   <p:cSld>
     <p:bg>
@@ -5467,80 +5907,75 @@
           <a:p>
             <a:r>
               <a:rPr lang="fr-FR" dirty="0"/>
-              <a:t>Analyse 4 :</a:t>
+              <a:t>Analyse 4 : Nbre vaccinés / Tranches d’âge </a:t>
             </a:r>
           </a:p>
         </p:txBody>
       </p:sp>
+      <p:pic>
+        <p:nvPicPr>
+          <p:cNvPr id="4" name="Image 3">
+            <a:extLst>
+              <a:ext uri="{FF2B5EF4-FFF2-40B4-BE49-F238E27FC236}">
+                <a16:creationId xmlns:a16="http://schemas.microsoft.com/office/drawing/2014/main" id="{A638FCC7-6DE2-1885-376E-2F30A486AA76}"/>
+              </a:ext>
+            </a:extLst>
+          </p:cNvPr>
+          <p:cNvPicPr>
+            <a:picLocks noChangeAspect="1"/>
+          </p:cNvPicPr>
+          <p:nvPr/>
+        </p:nvPicPr>
+        <p:blipFill>
+          <a:blip r:embed="rId4"/>
+          <a:stretch>
+            <a:fillRect/>
+          </a:stretch>
+        </p:blipFill>
+        <p:spPr>
+          <a:xfrm>
+            <a:off x="1097279" y="2263333"/>
+            <a:ext cx="4526488" cy="3841748"/>
+          </a:xfrm>
+          <a:prstGeom prst="rect">
+            <a:avLst/>
+          </a:prstGeom>
+        </p:spPr>
+      </p:pic>
+      <p:pic>
+        <p:nvPicPr>
+          <p:cNvPr id="6" name="Image 5">
+            <a:extLst>
+              <a:ext uri="{FF2B5EF4-FFF2-40B4-BE49-F238E27FC236}">
+                <a16:creationId xmlns:a16="http://schemas.microsoft.com/office/drawing/2014/main" id="{E0FDFFE8-AB14-EA7C-594E-0B48E0354B9A}"/>
+              </a:ext>
+            </a:extLst>
+          </p:cNvPr>
+          <p:cNvPicPr>
+            <a:picLocks noChangeAspect="1"/>
+          </p:cNvPicPr>
+          <p:nvPr/>
+        </p:nvPicPr>
+        <p:blipFill>
+          <a:blip r:embed="rId5"/>
+          <a:stretch>
+            <a:fillRect/>
+          </a:stretch>
+        </p:blipFill>
+        <p:spPr>
+          <a:xfrm>
+            <a:off x="6233362" y="2560424"/>
+            <a:ext cx="5130804" cy="3247566"/>
+          </a:xfrm>
+          <a:prstGeom prst="rect">
+            <a:avLst/>
+          </a:prstGeom>
+        </p:spPr>
+      </p:pic>
     </p:spTree>
     <p:extLst>
       <p:ext uri="{BB962C8B-B14F-4D97-AF65-F5344CB8AC3E}">
         <p14:creationId xmlns:p14="http://schemas.microsoft.com/office/powerpoint/2010/main" val="3344351138"/>
-      </p:ext>
-    </p:extLst>
-  </p:cSld>
-  <p:clrMapOvr>
-    <a:masterClrMapping/>
-  </p:clrMapOvr>
-</p:sld>
-</file>
-
-<file path=ppt/slides/slide12.xml><?xml version="1.0" encoding="utf-8"?>
-<p:sld xmlns:a="http://schemas.openxmlformats.org/drawingml/2006/main" xmlns:r="http://schemas.openxmlformats.org/officeDocument/2006/relationships" xmlns:p="http://schemas.openxmlformats.org/presentationml/2006/main">
-  <p:cSld>
-    <p:spTree>
-      <p:nvGrpSpPr>
-        <p:cNvPr id="1" name=""/>
-        <p:cNvGrpSpPr/>
-        <p:nvPr/>
-      </p:nvGrpSpPr>
-      <p:grpSpPr>
-        <a:xfrm>
-          <a:off x="0" y="0"/>
-          <a:ext cx="0" cy="0"/>
-          <a:chOff x="0" y="0"/>
-          <a:chExt cx="0" cy="0"/>
-        </a:xfrm>
-      </p:grpSpPr>
-      <p:sp>
-        <p:nvSpPr>
-          <p:cNvPr id="2" name="Titre 1">
-            <a:extLst>
-              <a:ext uri="{FF2B5EF4-FFF2-40B4-BE49-F238E27FC236}">
-                <a16:creationId xmlns:a16="http://schemas.microsoft.com/office/drawing/2014/main" id="{75AC86D3-8FD1-4F47-A319-7D0542E48B2F}"/>
-              </a:ext>
-            </a:extLst>
-          </p:cNvPr>
-          <p:cNvSpPr>
-            <a:spLocks noGrp="1"/>
-          </p:cNvSpPr>
-          <p:nvPr>
-            <p:ph type="title"/>
-          </p:nvPr>
-        </p:nvSpPr>
-        <p:spPr>
-          <a:xfrm>
-            <a:off x="1097279" y="286603"/>
-            <a:ext cx="10679917" cy="1450757"/>
-          </a:xfrm>
-        </p:spPr>
-        <p:txBody>
-          <a:bodyPr vert="horz" lIns="91440" tIns="45720" rIns="91440" bIns="45720" rtlCol="0">
-            <a:normAutofit/>
-          </a:bodyPr>
-          <a:lstStyle/>
-          <a:p>
-            <a:r>
-              <a:rPr lang="fr-FR" dirty="0"/>
-              <a:t>Analyse 5 :</a:t>
-            </a:r>
-          </a:p>
-        </p:txBody>
-      </p:sp>
-    </p:spTree>
-    <p:extLst>
-      <p:ext uri="{BB962C8B-B14F-4D97-AF65-F5344CB8AC3E}">
-        <p14:creationId xmlns:p14="http://schemas.microsoft.com/office/powerpoint/2010/main" val="1343382333"/>
       </p:ext>
     </p:extLst>
   </p:cSld>
@@ -5597,15 +6032,571 @@
           <a:p>
             <a:r>
               <a:rPr lang="fr-FR" dirty="0"/>
-              <a:t>Analyse 5 :</a:t>
+              <a:t>Analyse 4 : Nbre vaccinés / Tranches d’âge </a:t>
             </a:r>
           </a:p>
         </p:txBody>
       </p:sp>
+      <p:pic>
+        <p:nvPicPr>
+          <p:cNvPr id="4" name="Image 3">
+            <a:extLst>
+              <a:ext uri="{FF2B5EF4-FFF2-40B4-BE49-F238E27FC236}">
+                <a16:creationId xmlns:a16="http://schemas.microsoft.com/office/drawing/2014/main" id="{8C89CA9C-B619-CEEE-0F71-A4DCFB2E5F70}"/>
+              </a:ext>
+            </a:extLst>
+          </p:cNvPr>
+          <p:cNvPicPr>
+            <a:picLocks noChangeAspect="1"/>
+          </p:cNvPicPr>
+          <p:nvPr/>
+        </p:nvPicPr>
+        <p:blipFill>
+          <a:blip r:embed="rId3"/>
+          <a:stretch>
+            <a:fillRect/>
+          </a:stretch>
+        </p:blipFill>
+        <p:spPr>
+          <a:xfrm>
+            <a:off x="4905287" y="2125721"/>
+            <a:ext cx="6294665" cy="2994920"/>
+          </a:xfrm>
+          <a:prstGeom prst="rect">
+            <a:avLst/>
+          </a:prstGeom>
+        </p:spPr>
+      </p:pic>
+      <p:pic>
+        <p:nvPicPr>
+          <p:cNvPr id="6" name="Image 5">
+            <a:extLst>
+              <a:ext uri="{FF2B5EF4-FFF2-40B4-BE49-F238E27FC236}">
+                <a16:creationId xmlns:a16="http://schemas.microsoft.com/office/drawing/2014/main" id="{FDA02A36-28CE-CC78-CBFA-FCA4758AE0E9}"/>
+              </a:ext>
+            </a:extLst>
+          </p:cNvPr>
+          <p:cNvPicPr>
+            <a:picLocks noChangeAspect="1"/>
+          </p:cNvPicPr>
+          <p:nvPr/>
+        </p:nvPicPr>
+        <p:blipFill>
+          <a:blip r:embed="rId4"/>
+          <a:stretch>
+            <a:fillRect/>
+          </a:stretch>
+        </p:blipFill>
+        <p:spPr>
+          <a:xfrm>
+            <a:off x="1434685" y="3099061"/>
+            <a:ext cx="2752030" cy="951830"/>
+          </a:xfrm>
+          <a:prstGeom prst="rect">
+            <a:avLst/>
+          </a:prstGeom>
+        </p:spPr>
+      </p:pic>
+    </p:spTree>
+    <p:extLst>
+      <p:ext uri="{BB962C8B-B14F-4D97-AF65-F5344CB8AC3E}">
+        <p14:creationId xmlns:p14="http://schemas.microsoft.com/office/powerpoint/2010/main" val="3879325116"/>
+      </p:ext>
+    </p:extLst>
+  </p:cSld>
+  <p:clrMapOvr>
+    <a:masterClrMapping/>
+  </p:clrMapOvr>
+</p:sld>
+</file>
+
+<file path=ppt/slides/slide14.xml><?xml version="1.0" encoding="utf-8"?>
+<p:sld xmlns:a="http://schemas.openxmlformats.org/drawingml/2006/main" xmlns:r="http://schemas.openxmlformats.org/officeDocument/2006/relationships" xmlns:p="http://schemas.openxmlformats.org/presentationml/2006/main">
+  <p:cSld>
+    <p:spTree>
+      <p:nvGrpSpPr>
+        <p:cNvPr id="1" name=""/>
+        <p:cNvGrpSpPr/>
+        <p:nvPr/>
+      </p:nvGrpSpPr>
+      <p:grpSpPr>
+        <a:xfrm>
+          <a:off x="0" y="0"/>
+          <a:ext cx="0" cy="0"/>
+          <a:chOff x="0" y="0"/>
+          <a:chExt cx="0" cy="0"/>
+        </a:xfrm>
+      </p:grpSpPr>
+      <p:sp>
+        <p:nvSpPr>
+          <p:cNvPr id="2" name="Titre 1">
+            <a:extLst>
+              <a:ext uri="{FF2B5EF4-FFF2-40B4-BE49-F238E27FC236}">
+                <a16:creationId xmlns:a16="http://schemas.microsoft.com/office/drawing/2014/main" id="{75AC86D3-8FD1-4F47-A319-7D0542E48B2F}"/>
+              </a:ext>
+            </a:extLst>
+          </p:cNvPr>
+          <p:cNvSpPr>
+            <a:spLocks noGrp="1"/>
+          </p:cNvSpPr>
+          <p:nvPr>
+            <p:ph type="title"/>
+          </p:nvPr>
+        </p:nvSpPr>
+        <p:spPr>
+          <a:xfrm>
+            <a:off x="1097279" y="286603"/>
+            <a:ext cx="10679917" cy="1450757"/>
+          </a:xfrm>
+        </p:spPr>
+        <p:txBody>
+          <a:bodyPr vert="horz" lIns="91440" tIns="45720" rIns="91440" bIns="45720" rtlCol="0">
+            <a:normAutofit/>
+          </a:bodyPr>
+          <a:lstStyle/>
+          <a:p>
+            <a:r>
+              <a:rPr lang="fr-FR" dirty="0"/>
+              <a:t>Analyse 5 : Nbre vaccinés après contamination</a:t>
+            </a:r>
+          </a:p>
+        </p:txBody>
+      </p:sp>
+      <p:pic>
+        <p:nvPicPr>
+          <p:cNvPr id="4" name="Image 3">
+            <a:extLst>
+              <a:ext uri="{FF2B5EF4-FFF2-40B4-BE49-F238E27FC236}">
+                <a16:creationId xmlns:a16="http://schemas.microsoft.com/office/drawing/2014/main" id="{89A6C675-CB86-9415-6788-4EDF245BD294}"/>
+              </a:ext>
+            </a:extLst>
+          </p:cNvPr>
+          <p:cNvPicPr>
+            <a:picLocks noChangeAspect="1"/>
+          </p:cNvPicPr>
+          <p:nvPr/>
+        </p:nvPicPr>
+        <p:blipFill>
+          <a:blip r:embed="rId3"/>
+          <a:stretch>
+            <a:fillRect/>
+          </a:stretch>
+        </p:blipFill>
+        <p:spPr>
+          <a:xfrm>
+            <a:off x="4688750" y="2103912"/>
+            <a:ext cx="2814499" cy="4060721"/>
+          </a:xfrm>
+          <a:prstGeom prst="rect">
+            <a:avLst/>
+          </a:prstGeom>
+        </p:spPr>
+      </p:pic>
+    </p:spTree>
+    <p:extLst>
+      <p:ext uri="{BB962C8B-B14F-4D97-AF65-F5344CB8AC3E}">
+        <p14:creationId xmlns:p14="http://schemas.microsoft.com/office/powerpoint/2010/main" val="1343382333"/>
+      </p:ext>
+    </p:extLst>
+  </p:cSld>
+  <p:clrMapOvr>
+    <a:masterClrMapping/>
+  </p:clrMapOvr>
+</p:sld>
+</file>
+
+<file path=ppt/slides/slide15.xml><?xml version="1.0" encoding="utf-8"?>
+<p:sld xmlns:a="http://schemas.openxmlformats.org/drawingml/2006/main" xmlns:r="http://schemas.openxmlformats.org/officeDocument/2006/relationships" xmlns:p="http://schemas.openxmlformats.org/presentationml/2006/main">
+  <p:cSld>
+    <p:spTree>
+      <p:nvGrpSpPr>
+        <p:cNvPr id="1" name=""/>
+        <p:cNvGrpSpPr/>
+        <p:nvPr/>
+      </p:nvGrpSpPr>
+      <p:grpSpPr>
+        <a:xfrm>
+          <a:off x="0" y="0"/>
+          <a:ext cx="0" cy="0"/>
+          <a:chOff x="0" y="0"/>
+          <a:chExt cx="0" cy="0"/>
+        </a:xfrm>
+      </p:grpSpPr>
+      <p:sp>
+        <p:nvSpPr>
+          <p:cNvPr id="2" name="Titre 1">
+            <a:extLst>
+              <a:ext uri="{FF2B5EF4-FFF2-40B4-BE49-F238E27FC236}">
+                <a16:creationId xmlns:a16="http://schemas.microsoft.com/office/drawing/2014/main" id="{75AC86D3-8FD1-4F47-A319-7D0542E48B2F}"/>
+              </a:ext>
+            </a:extLst>
+          </p:cNvPr>
+          <p:cNvSpPr>
+            <a:spLocks noGrp="1"/>
+          </p:cNvSpPr>
+          <p:nvPr>
+            <p:ph type="title"/>
+          </p:nvPr>
+        </p:nvSpPr>
+        <p:spPr>
+          <a:xfrm>
+            <a:off x="1097279" y="286603"/>
+            <a:ext cx="10679917" cy="1450757"/>
+          </a:xfrm>
+        </p:spPr>
+        <p:txBody>
+          <a:bodyPr vert="horz" lIns="91440" tIns="45720" rIns="91440" bIns="45720" rtlCol="0">
+            <a:normAutofit/>
+          </a:bodyPr>
+          <a:lstStyle/>
+          <a:p>
+            <a:r>
+              <a:rPr lang="fr-FR" dirty="0"/>
+              <a:t>Analyse 5 : Nbre vaccinés après contamination</a:t>
+            </a:r>
+          </a:p>
+        </p:txBody>
+      </p:sp>
+      <p:pic>
+        <p:nvPicPr>
+          <p:cNvPr id="4" name="Image 3">
+            <a:extLst>
+              <a:ext uri="{FF2B5EF4-FFF2-40B4-BE49-F238E27FC236}">
+                <a16:creationId xmlns:a16="http://schemas.microsoft.com/office/drawing/2014/main" id="{F3121EAD-5002-7CF2-94DE-91D9B66663B4}"/>
+              </a:ext>
+            </a:extLst>
+          </p:cNvPr>
+          <p:cNvPicPr>
+            <a:picLocks noChangeAspect="1"/>
+          </p:cNvPicPr>
+          <p:nvPr/>
+        </p:nvPicPr>
+        <p:blipFill>
+          <a:blip r:embed="rId3"/>
+          <a:stretch>
+            <a:fillRect/>
+          </a:stretch>
+        </p:blipFill>
+        <p:spPr>
+          <a:xfrm>
+            <a:off x="619432" y="2099113"/>
+            <a:ext cx="4929316" cy="2317299"/>
+          </a:xfrm>
+          <a:prstGeom prst="rect">
+            <a:avLst/>
+          </a:prstGeom>
+        </p:spPr>
+      </p:pic>
+      <p:pic>
+        <p:nvPicPr>
+          <p:cNvPr id="6" name="Image 5">
+            <a:extLst>
+              <a:ext uri="{FF2B5EF4-FFF2-40B4-BE49-F238E27FC236}">
+                <a16:creationId xmlns:a16="http://schemas.microsoft.com/office/drawing/2014/main" id="{A3EB9D74-5AF8-E757-084C-DBA963181412}"/>
+              </a:ext>
+            </a:extLst>
+          </p:cNvPr>
+          <p:cNvPicPr>
+            <a:picLocks noChangeAspect="1"/>
+          </p:cNvPicPr>
+          <p:nvPr/>
+        </p:nvPicPr>
+        <p:blipFill>
+          <a:blip r:embed="rId4"/>
+          <a:stretch>
+            <a:fillRect/>
+          </a:stretch>
+        </p:blipFill>
+        <p:spPr>
+          <a:xfrm>
+            <a:off x="6643253" y="2165242"/>
+            <a:ext cx="4929316" cy="2185042"/>
+          </a:xfrm>
+          <a:prstGeom prst="rect">
+            <a:avLst/>
+          </a:prstGeom>
+        </p:spPr>
+      </p:pic>
+      <p:sp>
+        <p:nvSpPr>
+          <p:cNvPr id="7" name="Titre 1">
+            <a:extLst>
+              <a:ext uri="{FF2B5EF4-FFF2-40B4-BE49-F238E27FC236}">
+                <a16:creationId xmlns:a16="http://schemas.microsoft.com/office/drawing/2014/main" id="{0D14DBC8-D31F-8CE8-D6AA-9E24FDCD07C5}"/>
+              </a:ext>
+            </a:extLst>
+          </p:cNvPr>
+          <p:cNvSpPr txBox="1">
+            <a:spLocks/>
+          </p:cNvSpPr>
+          <p:nvPr/>
+        </p:nvSpPr>
+        <p:spPr>
+          <a:xfrm>
+            <a:off x="4874715" y="5781368"/>
+            <a:ext cx="2617465" cy="316598"/>
+          </a:xfrm>
+          <a:prstGeom prst="rect">
+            <a:avLst/>
+          </a:prstGeom>
+        </p:spPr>
+        <p:txBody>
+          <a:bodyPr vert="horz" lIns="91440" tIns="45720" rIns="91440" bIns="45720" rtlCol="0" anchor="b">
+            <a:normAutofit fontScale="92500"/>
+          </a:bodyPr>
+          <a:lstStyle>
+            <a:lvl1pPr algn="l" defTabSz="914400" rtl="0" eaLnBrk="1" latinLnBrk="0" hangingPunct="1">
+              <a:lnSpc>
+                <a:spcPct val="90000"/>
+              </a:lnSpc>
+              <a:spcBef>
+                <a:spcPct val="0"/>
+              </a:spcBef>
+              <a:buNone/>
+              <a:defRPr sz="4700" i="0" kern="1200" spc="-50" baseline="0">
+                <a:solidFill>
+                  <a:schemeClr val="tx1">
+                    <a:lumMod val="75000"/>
+                    <a:lumOff val="25000"/>
+                  </a:schemeClr>
+                </a:solidFill>
+                <a:latin typeface="+mj-lt"/>
+                <a:ea typeface="+mj-ea"/>
+                <a:cs typeface="+mj-cs"/>
+              </a:defRPr>
+            </a:lvl1pPr>
+          </a:lstStyle>
+          <a:p>
+            <a:r>
+              <a:rPr lang="fr-FR" sz="1400" dirty="0"/>
+              <a:t>(Données &lt; 0) = proche de nulle</a:t>
+            </a:r>
+          </a:p>
+        </p:txBody>
+      </p:sp>
+      <p:pic>
+        <p:nvPicPr>
+          <p:cNvPr id="9" name="Image 8">
+            <a:extLst>
+              <a:ext uri="{FF2B5EF4-FFF2-40B4-BE49-F238E27FC236}">
+                <a16:creationId xmlns:a16="http://schemas.microsoft.com/office/drawing/2014/main" id="{D4C736C3-1CB9-4BD7-E37D-84481B745CB5}"/>
+              </a:ext>
+            </a:extLst>
+          </p:cNvPr>
+          <p:cNvPicPr>
+            <a:picLocks noChangeAspect="1"/>
+          </p:cNvPicPr>
+          <p:nvPr/>
+        </p:nvPicPr>
+        <p:blipFill>
+          <a:blip r:embed="rId5"/>
+          <a:stretch>
+            <a:fillRect/>
+          </a:stretch>
+        </p:blipFill>
+        <p:spPr>
+          <a:xfrm>
+            <a:off x="8109604" y="4576764"/>
+            <a:ext cx="1996613" cy="693480"/>
+          </a:xfrm>
+          <a:prstGeom prst="rect">
+            <a:avLst/>
+          </a:prstGeom>
+        </p:spPr>
+      </p:pic>
+      <p:pic>
+        <p:nvPicPr>
+          <p:cNvPr id="11" name="Image 10">
+            <a:extLst>
+              <a:ext uri="{FF2B5EF4-FFF2-40B4-BE49-F238E27FC236}">
+                <a16:creationId xmlns:a16="http://schemas.microsoft.com/office/drawing/2014/main" id="{47C0C684-61A2-6E4E-6855-F135E0E10D8D}"/>
+              </a:ext>
+            </a:extLst>
+          </p:cNvPr>
+          <p:cNvPicPr>
+            <a:picLocks noChangeAspect="1"/>
+          </p:cNvPicPr>
+          <p:nvPr/>
+        </p:nvPicPr>
+        <p:blipFill>
+          <a:blip r:embed="rId6"/>
+          <a:stretch>
+            <a:fillRect/>
+          </a:stretch>
+        </p:blipFill>
+        <p:spPr>
+          <a:xfrm>
+            <a:off x="2256171" y="4576764"/>
+            <a:ext cx="1996613" cy="701101"/>
+          </a:xfrm>
+          <a:prstGeom prst="rect">
+            <a:avLst/>
+          </a:prstGeom>
+        </p:spPr>
+      </p:pic>
     </p:spTree>
     <p:extLst>
       <p:ext uri="{BB962C8B-B14F-4D97-AF65-F5344CB8AC3E}">
         <p14:creationId xmlns:p14="http://schemas.microsoft.com/office/powerpoint/2010/main" val="3169691364"/>
+      </p:ext>
+    </p:extLst>
+  </p:cSld>
+  <p:clrMapOvr>
+    <a:masterClrMapping/>
+  </p:clrMapOvr>
+</p:sld>
+</file>
+
+<file path=ppt/slides/slide16.xml><?xml version="1.0" encoding="utf-8"?>
+<p:sld xmlns:a="http://schemas.openxmlformats.org/drawingml/2006/main" xmlns:r="http://schemas.openxmlformats.org/officeDocument/2006/relationships" xmlns:p="http://schemas.openxmlformats.org/presentationml/2006/main">
+  <p:cSld>
+    <p:spTree>
+      <p:nvGrpSpPr>
+        <p:cNvPr id="1" name=""/>
+        <p:cNvGrpSpPr/>
+        <p:nvPr/>
+      </p:nvGrpSpPr>
+      <p:grpSpPr>
+        <a:xfrm>
+          <a:off x="0" y="0"/>
+          <a:ext cx="0" cy="0"/>
+          <a:chOff x="0" y="0"/>
+          <a:chExt cx="0" cy="0"/>
+        </a:xfrm>
+      </p:grpSpPr>
+      <p:sp>
+        <p:nvSpPr>
+          <p:cNvPr id="2" name="Titre 1">
+            <a:extLst>
+              <a:ext uri="{FF2B5EF4-FFF2-40B4-BE49-F238E27FC236}">
+                <a16:creationId xmlns:a16="http://schemas.microsoft.com/office/drawing/2014/main" id="{75AC86D3-8FD1-4F47-A319-7D0542E48B2F}"/>
+              </a:ext>
+            </a:extLst>
+          </p:cNvPr>
+          <p:cNvSpPr>
+            <a:spLocks noGrp="1"/>
+          </p:cNvSpPr>
+          <p:nvPr>
+            <p:ph type="title"/>
+          </p:nvPr>
+        </p:nvSpPr>
+        <p:spPr>
+          <a:xfrm>
+            <a:off x="1097279" y="286603"/>
+            <a:ext cx="10679917" cy="1450757"/>
+          </a:xfrm>
+        </p:spPr>
+        <p:txBody>
+          <a:bodyPr vert="horz" lIns="91440" tIns="45720" rIns="91440" bIns="45720" rtlCol="0">
+            <a:normAutofit/>
+          </a:bodyPr>
+          <a:lstStyle/>
+          <a:p>
+            <a:r>
+              <a:rPr lang="fr-FR" dirty="0"/>
+              <a:t>Conclusion</a:t>
+            </a:r>
+          </a:p>
+        </p:txBody>
+      </p:sp>
+      <p:pic>
+        <p:nvPicPr>
+          <p:cNvPr id="1026" name="Picture 2" descr="Trello-logo - Arteo Conseil">
+            <a:extLst>
+              <a:ext uri="{FF2B5EF4-FFF2-40B4-BE49-F238E27FC236}">
+                <a16:creationId xmlns:a16="http://schemas.microsoft.com/office/drawing/2014/main" id="{74DC649A-48D7-B79D-B024-BAF908CD98CF}"/>
+              </a:ext>
+            </a:extLst>
+          </p:cNvPr>
+          <p:cNvPicPr>
+            <a:picLocks noChangeAspect="1" noChangeArrowheads="1"/>
+          </p:cNvPicPr>
+          <p:nvPr/>
+        </p:nvPicPr>
+        <p:blipFill>
+          <a:blip r:embed="rId3">
+            <a:extLst>
+              <a:ext uri="{28A0092B-C50C-407E-A947-70E740481C1C}">
+                <a14:useLocalDpi xmlns:a14="http://schemas.microsoft.com/office/drawing/2010/main" val="0"/>
+              </a:ext>
+            </a:extLst>
+          </a:blip>
+          <a:srcRect/>
+          <a:stretch>
+            <a:fillRect/>
+          </a:stretch>
+        </p:blipFill>
+        <p:spPr bwMode="auto">
+          <a:xfrm>
+            <a:off x="0" y="3002544"/>
+            <a:ext cx="6521246" cy="2005283"/>
+          </a:xfrm>
+          <a:prstGeom prst="rect">
+            <a:avLst/>
+          </a:prstGeom>
+          <a:noFill/>
+          <a:extLst>
+            <a:ext uri="{909E8E84-426E-40DD-AFC4-6F175D3DCCD1}">
+              <a14:hiddenFill xmlns:a14="http://schemas.microsoft.com/office/drawing/2010/main">
+                <a:solidFill>
+                  <a:srgbClr val="FFFFFF"/>
+                </a:solidFill>
+              </a14:hiddenFill>
+            </a:ext>
+          </a:extLst>
+        </p:spPr>
+      </p:pic>
+      <p:pic>
+        <p:nvPicPr>
+          <p:cNvPr id="1028" name="Picture 4" descr="GitHub Logo: valor, história, PNG">
+            <a:extLst>
+              <a:ext uri="{FF2B5EF4-FFF2-40B4-BE49-F238E27FC236}">
+                <a16:creationId xmlns:a16="http://schemas.microsoft.com/office/drawing/2014/main" id="{ABEADA2F-4E7C-B97A-835D-1B27ABED16E3}"/>
+              </a:ext>
+            </a:extLst>
+          </p:cNvPr>
+          <p:cNvPicPr>
+            <a:picLocks noChangeAspect="1" noChangeArrowheads="1"/>
+          </p:cNvPicPr>
+          <p:nvPr/>
+        </p:nvPicPr>
+        <p:blipFill>
+          <a:blip r:embed="rId4">
+            <a:extLst>
+              <a:ext uri="{28A0092B-C50C-407E-A947-70E740481C1C}">
+                <a14:useLocalDpi xmlns:a14="http://schemas.microsoft.com/office/drawing/2010/main" val="0"/>
+              </a:ext>
+            </a:extLst>
+          </a:blip>
+          <a:srcRect/>
+          <a:stretch>
+            <a:fillRect/>
+          </a:stretch>
+        </p:blipFill>
+        <p:spPr bwMode="auto">
+          <a:xfrm>
+            <a:off x="6695768" y="2644878"/>
+            <a:ext cx="4836652" cy="2720617"/>
+          </a:xfrm>
+          <a:prstGeom prst="rect">
+            <a:avLst/>
+          </a:prstGeom>
+          <a:noFill/>
+          <a:extLst>
+            <a:ext uri="{909E8E84-426E-40DD-AFC4-6F175D3DCCD1}">
+              <a14:hiddenFill xmlns:a14="http://schemas.microsoft.com/office/drawing/2010/main">
+                <a:solidFill>
+                  <a:srgbClr val="FFFFFF"/>
+                </a:solidFill>
+              </a14:hiddenFill>
+            </a:ext>
+          </a:extLst>
+        </p:spPr>
+      </p:pic>
+    </p:spTree>
+    <p:extLst>
+      <p:ext uri="{BB962C8B-B14F-4D97-AF65-F5344CB8AC3E}">
+        <p14:creationId xmlns:p14="http://schemas.microsoft.com/office/powerpoint/2010/main" val="2998715738"/>
       </p:ext>
     </p:extLst>
   </p:cSld>
@@ -5697,7 +6688,7 @@
         </p:blipFill>
         <p:spPr>
           <a:xfrm>
-            <a:off x="1164291" y="2140654"/>
+            <a:off x="5220652" y="2199648"/>
             <a:ext cx="1750695" cy="3800475"/>
           </a:xfrm>
           <a:prstGeom prst="rect">
@@ -5800,7 +6791,7 @@
         </p:blipFill>
         <p:spPr>
           <a:xfrm>
-            <a:off x="145040" y="2415166"/>
+            <a:off x="3246437" y="2257849"/>
             <a:ext cx="5760085" cy="3811270"/>
           </a:xfrm>
           <a:prstGeom prst="rect">
@@ -6030,7 +7021,7 @@
           <a:p>
             <a:r>
               <a:rPr lang="fr-FR" dirty="0"/>
-              <a:t>Analyse 2 : Nombre vacciné (2R,HF)</a:t>
+              <a:t>Analyse 2 : Nombre vaccinés (2R,HF)</a:t>
             </a:r>
           </a:p>
         </p:txBody>
@@ -6163,7 +7154,7 @@
           <a:p>
             <a:r>
               <a:rPr lang="fr-FR" dirty="0"/>
-              <a:t>Analyse 2 : Nombre vacciné (2R,HF)</a:t>
+              <a:t>Analyse 2 : Nombre vaccinés (2R,HF)</a:t>
             </a:r>
           </a:p>
         </p:txBody>
@@ -6296,17 +7287,17 @@
           <a:p>
             <a:r>
               <a:rPr lang="fr-FR" dirty="0"/>
-              <a:t>Analyse 2 : Nombre vacciné (2R,HF)</a:t>
+              <a:t>Analyse 2 : Nombre vaccinés (2R,HF)</a:t>
             </a:r>
           </a:p>
         </p:txBody>
       </p:sp>
       <p:pic>
         <p:nvPicPr>
-          <p:cNvPr id="3" name="Image 2">
+          <p:cNvPr id="5" name="Image 4">
             <a:extLst>
               <a:ext uri="{FF2B5EF4-FFF2-40B4-BE49-F238E27FC236}">
-                <a16:creationId xmlns:a16="http://schemas.microsoft.com/office/drawing/2014/main" id="{79B893DE-084B-3495-66B7-BA2723D5DC86}"/>
+                <a16:creationId xmlns:a16="http://schemas.microsoft.com/office/drawing/2014/main" id="{C09A92DB-A78D-5A5B-D7F3-87C7A23D5139}"/>
               </a:ext>
             </a:extLst>
           </p:cNvPr>
@@ -6323,8 +7314,98 @@
         </p:blipFill>
         <p:spPr>
           <a:xfrm>
-            <a:off x="3215957" y="2405000"/>
-            <a:ext cx="5760085" cy="3725545"/>
+            <a:off x="5986242" y="2011557"/>
+            <a:ext cx="5516229" cy="2481303"/>
+          </a:xfrm>
+          <a:prstGeom prst="rect">
+            <a:avLst/>
+          </a:prstGeom>
+        </p:spPr>
+      </p:pic>
+      <p:pic>
+        <p:nvPicPr>
+          <p:cNvPr id="7" name="Image 6">
+            <a:extLst>
+              <a:ext uri="{FF2B5EF4-FFF2-40B4-BE49-F238E27FC236}">
+                <a16:creationId xmlns:a16="http://schemas.microsoft.com/office/drawing/2014/main" id="{D9110EDE-A15E-5A43-9025-71BA412936A5}"/>
+              </a:ext>
+            </a:extLst>
+          </p:cNvPr>
+          <p:cNvPicPr>
+            <a:picLocks noChangeAspect="1"/>
+          </p:cNvPicPr>
+          <p:nvPr/>
+        </p:nvPicPr>
+        <p:blipFill>
+          <a:blip r:embed="rId4"/>
+          <a:stretch>
+            <a:fillRect/>
+          </a:stretch>
+        </p:blipFill>
+        <p:spPr>
+          <a:xfrm>
+            <a:off x="470013" y="3879989"/>
+            <a:ext cx="5516229" cy="2481303"/>
+          </a:xfrm>
+          <a:prstGeom prst="rect">
+            <a:avLst/>
+          </a:prstGeom>
+        </p:spPr>
+      </p:pic>
+      <p:pic>
+        <p:nvPicPr>
+          <p:cNvPr id="9" name="Image 8">
+            <a:extLst>
+              <a:ext uri="{FF2B5EF4-FFF2-40B4-BE49-F238E27FC236}">
+                <a16:creationId xmlns:a16="http://schemas.microsoft.com/office/drawing/2014/main" id="{256A54B4-A33C-1CDC-19B3-D80CA97D9907}"/>
+              </a:ext>
+            </a:extLst>
+          </p:cNvPr>
+          <p:cNvPicPr>
+            <a:picLocks noChangeAspect="1"/>
+          </p:cNvPicPr>
+          <p:nvPr/>
+        </p:nvPicPr>
+        <p:blipFill>
+          <a:blip r:embed="rId5"/>
+          <a:stretch>
+            <a:fillRect/>
+          </a:stretch>
+        </p:blipFill>
+        <p:spPr>
+          <a:xfrm>
+            <a:off x="5986242" y="5236081"/>
+            <a:ext cx="2034716" cy="693480"/>
+          </a:xfrm>
+          <a:prstGeom prst="rect">
+            <a:avLst/>
+          </a:prstGeom>
+        </p:spPr>
+      </p:pic>
+      <p:pic>
+        <p:nvPicPr>
+          <p:cNvPr id="11" name="Image 10">
+            <a:extLst>
+              <a:ext uri="{FF2B5EF4-FFF2-40B4-BE49-F238E27FC236}">
+                <a16:creationId xmlns:a16="http://schemas.microsoft.com/office/drawing/2014/main" id="{2579D2EB-1CCE-ACF9-4AD2-3EC27499F2AD}"/>
+              </a:ext>
+            </a:extLst>
+          </p:cNvPr>
+          <p:cNvPicPr>
+            <a:picLocks noChangeAspect="1"/>
+          </p:cNvPicPr>
+          <p:nvPr/>
+        </p:nvPicPr>
+        <p:blipFill>
+          <a:blip r:embed="rId6"/>
+          <a:stretch>
+            <a:fillRect/>
+          </a:stretch>
+        </p:blipFill>
+        <p:spPr>
+          <a:xfrm>
+            <a:off x="3716981" y="2107573"/>
+            <a:ext cx="2034716" cy="701101"/>
           </a:xfrm>
           <a:prstGeom prst="rect">
             <a:avLst/>
@@ -6399,51 +7480,71 @@
           <a:p>
             <a:r>
               <a:rPr lang="fr-FR" dirty="0"/>
-              <a:t>Analyse 3 : </a:t>
+              <a:t>Analyse 3 : Nbre vaccinés / Région </a:t>
             </a:r>
           </a:p>
         </p:txBody>
       </p:sp>
-      <p:sp>
-        <p:nvSpPr>
-          <p:cNvPr id="5" name="ZoneTexte 4">
+      <p:pic>
+        <p:nvPicPr>
+          <p:cNvPr id="4" name="Image 3">
             <a:extLst>
               <a:ext uri="{FF2B5EF4-FFF2-40B4-BE49-F238E27FC236}">
-                <a16:creationId xmlns:a16="http://schemas.microsoft.com/office/drawing/2014/main" id="{F52FCA73-BEEB-F9A9-6A8F-552E077094AC}"/>
+                <a16:creationId xmlns:a16="http://schemas.microsoft.com/office/drawing/2014/main" id="{AAB613F9-0AA5-C817-1F8C-C7C50A8C5D62}"/>
               </a:ext>
             </a:extLst>
           </p:cNvPr>
-          <p:cNvSpPr txBox="1"/>
+          <p:cNvPicPr>
+            <a:picLocks noChangeAspect="1"/>
+          </p:cNvPicPr>
           <p:nvPr/>
-        </p:nvSpPr>
-        <p:spPr>
-          <a:xfrm>
-            <a:off x="3671350" y="3052583"/>
-            <a:ext cx="2484655" cy="369332"/>
+        </p:nvPicPr>
+        <p:blipFill>
+          <a:blip r:embed="rId4"/>
+          <a:stretch>
+            <a:fillRect/>
+          </a:stretch>
+        </p:blipFill>
+        <p:spPr>
+          <a:xfrm>
+            <a:off x="710224" y="2244734"/>
+            <a:ext cx="5169097" cy="3698865"/>
           </a:xfrm>
           <a:prstGeom prst="rect">
             <a:avLst/>
           </a:prstGeom>
-          <a:noFill/>
-        </p:spPr>
-        <p:txBody>
-          <a:bodyPr wrap="none" rtlCol="0">
-            <a:spAutoFit/>
-          </a:bodyPr>
-          <a:lstStyle/>
-          <a:p>
-            <a:r>
-              <a:rPr lang="fr-FR" dirty="0"/>
-              <a:t>Mettre ici données </a:t>
-            </a:r>
-            <a:r>
-              <a:rPr lang="fr-FR" dirty="0" err="1"/>
-              <a:t>view</a:t>
-            </a:r>
-            <a:endParaRPr lang="fr-FR" dirty="0"/>
-          </a:p>
-        </p:txBody>
-      </p:sp>
+        </p:spPr>
+      </p:pic>
+      <p:pic>
+        <p:nvPicPr>
+          <p:cNvPr id="7" name="Image 6">
+            <a:extLst>
+              <a:ext uri="{FF2B5EF4-FFF2-40B4-BE49-F238E27FC236}">
+                <a16:creationId xmlns:a16="http://schemas.microsoft.com/office/drawing/2014/main" id="{03CCF6F2-21A1-7730-D782-4262BEF86450}"/>
+              </a:ext>
+            </a:extLst>
+          </p:cNvPr>
+          <p:cNvPicPr>
+            <a:picLocks noChangeAspect="1"/>
+          </p:cNvPicPr>
+          <p:nvPr/>
+        </p:nvPicPr>
+        <p:blipFill>
+          <a:blip r:embed="rId5"/>
+          <a:stretch>
+            <a:fillRect/>
+          </a:stretch>
+        </p:blipFill>
+        <p:spPr>
+          <a:xfrm>
+            <a:off x="7471130" y="2244734"/>
+            <a:ext cx="2319645" cy="3868310"/>
+          </a:xfrm>
+          <a:prstGeom prst="rect">
+            <a:avLst/>
+          </a:prstGeom>
+        </p:spPr>
+      </p:pic>
     </p:spTree>
     <p:extLst>
       <p:ext uri="{BB962C8B-B14F-4D97-AF65-F5344CB8AC3E}">
@@ -6504,51 +7605,71 @@
           <a:p>
             <a:r>
               <a:rPr lang="fr-FR" dirty="0"/>
-              <a:t>Analyse 3 : </a:t>
+              <a:t>Analyse 3 : Nbre vaccinés / Région </a:t>
             </a:r>
           </a:p>
         </p:txBody>
       </p:sp>
-      <p:sp>
-        <p:nvSpPr>
-          <p:cNvPr id="3" name="ZoneTexte 2">
+      <p:pic>
+        <p:nvPicPr>
+          <p:cNvPr id="5" name="Image 4">
             <a:extLst>
               <a:ext uri="{FF2B5EF4-FFF2-40B4-BE49-F238E27FC236}">
-                <a16:creationId xmlns:a16="http://schemas.microsoft.com/office/drawing/2014/main" id="{C3EE6FBA-B49F-15A4-C12D-2107F179F10E}"/>
+                <a16:creationId xmlns:a16="http://schemas.microsoft.com/office/drawing/2014/main" id="{6864476E-DB2D-42BE-309B-149D8FE213EE}"/>
               </a:ext>
             </a:extLst>
           </p:cNvPr>
-          <p:cNvSpPr txBox="1"/>
+          <p:cNvPicPr>
+            <a:picLocks noChangeAspect="1"/>
+          </p:cNvPicPr>
           <p:nvPr/>
-        </p:nvSpPr>
-        <p:spPr>
-          <a:xfrm>
-            <a:off x="3671350" y="3052583"/>
-            <a:ext cx="1715983" cy="369332"/>
+        </p:nvPicPr>
+        <p:blipFill>
+          <a:blip r:embed="rId3"/>
+          <a:stretch>
+            <a:fillRect/>
+          </a:stretch>
+        </p:blipFill>
+        <p:spPr>
+          <a:xfrm>
+            <a:off x="1509292" y="2244256"/>
+            <a:ext cx="4329972" cy="3749040"/>
           </a:xfrm>
           <a:prstGeom prst="rect">
             <a:avLst/>
           </a:prstGeom>
-          <a:noFill/>
-        </p:spPr>
-        <p:txBody>
-          <a:bodyPr wrap="none" rtlCol="0">
-            <a:spAutoFit/>
-          </a:bodyPr>
-          <a:lstStyle/>
-          <a:p>
-            <a:r>
-              <a:rPr lang="fr-FR" dirty="0"/>
-              <a:t>Mettre </a:t>
-            </a:r>
-            <a:r>
-              <a:rPr lang="fr-FR"/>
-              <a:t>ici graph</a:t>
-            </a:r>
-            <a:endParaRPr lang="fr-FR" dirty="0"/>
-          </a:p>
-        </p:txBody>
-      </p:sp>
+        </p:spPr>
+      </p:pic>
+      <p:pic>
+        <p:nvPicPr>
+          <p:cNvPr id="7" name="Image 6">
+            <a:extLst>
+              <a:ext uri="{FF2B5EF4-FFF2-40B4-BE49-F238E27FC236}">
+                <a16:creationId xmlns:a16="http://schemas.microsoft.com/office/drawing/2014/main" id="{0C0EC514-662F-1989-50F2-F3C74A1E6469}"/>
+              </a:ext>
+            </a:extLst>
+          </p:cNvPr>
+          <p:cNvPicPr>
+            <a:picLocks noChangeAspect="1"/>
+          </p:cNvPicPr>
+          <p:nvPr/>
+        </p:nvPicPr>
+        <p:blipFill>
+          <a:blip r:embed="rId4"/>
+          <a:stretch>
+            <a:fillRect/>
+          </a:stretch>
+        </p:blipFill>
+        <p:spPr>
+          <a:xfrm>
+            <a:off x="6252290" y="2244256"/>
+            <a:ext cx="5078320" cy="3697548"/>
+          </a:xfrm>
+          <a:prstGeom prst="rect">
+            <a:avLst/>
+          </a:prstGeom>
+        </p:spPr>
+      </p:pic>
     </p:spTree>
     <p:extLst>
       <p:ext uri="{BB962C8B-B14F-4D97-AF65-F5344CB8AC3E}">

</xml_diff>